<commit_message>
added isEqualTo to PasswordHash;  added PasswordEncryptedFile, ByteArray, and Base64Util; assorted fixes to existing classes
</commit_message>
<xml_diff>
--- a/cpg-tls-policy/src/site/resources/tls-policy-presentation-20min.pptx
+++ b/cpg-tls-policy/src/site/resources/tls-policy-presentation-20min.pptx
@@ -5,29 +5,32 @@
     <p:sldMasterId id="2147483648" r:id="rId1"/>
   </p:sldMasterIdLst>
   <p:notesMasterIdLst>
-    <p:notesMasterId r:id="rId22"/>
+    <p:notesMasterId r:id="rId25"/>
   </p:notesMasterIdLst>
   <p:sldIdLst>
     <p:sldId id="256" r:id="rId2"/>
-    <p:sldId id="259" r:id="rId3"/>
-    <p:sldId id="262" r:id="rId4"/>
-    <p:sldId id="263" r:id="rId5"/>
-    <p:sldId id="264" r:id="rId6"/>
-    <p:sldId id="265" r:id="rId7"/>
-    <p:sldId id="266" r:id="rId8"/>
-    <p:sldId id="267" r:id="rId9"/>
-    <p:sldId id="273" r:id="rId10"/>
-    <p:sldId id="275" r:id="rId11"/>
-    <p:sldId id="268" r:id="rId12"/>
-    <p:sldId id="269" r:id="rId13"/>
-    <p:sldId id="270" r:id="rId14"/>
-    <p:sldId id="271" r:id="rId15"/>
-    <p:sldId id="272" r:id="rId16"/>
-    <p:sldId id="274" r:id="rId17"/>
-    <p:sldId id="276" r:id="rId18"/>
-    <p:sldId id="277" r:id="rId19"/>
-    <p:sldId id="260" r:id="rId20"/>
-    <p:sldId id="261" r:id="rId21"/>
+    <p:sldId id="257" r:id="rId3"/>
+    <p:sldId id="258" r:id="rId4"/>
+    <p:sldId id="259" r:id="rId5"/>
+    <p:sldId id="260" r:id="rId6"/>
+    <p:sldId id="261" r:id="rId7"/>
+    <p:sldId id="262" r:id="rId8"/>
+    <p:sldId id="263" r:id="rId9"/>
+    <p:sldId id="264" r:id="rId10"/>
+    <p:sldId id="265" r:id="rId11"/>
+    <p:sldId id="266" r:id="rId12"/>
+    <p:sldId id="267" r:id="rId13"/>
+    <p:sldId id="268" r:id="rId14"/>
+    <p:sldId id="269" r:id="rId15"/>
+    <p:sldId id="270" r:id="rId16"/>
+    <p:sldId id="271" r:id="rId17"/>
+    <p:sldId id="272" r:id="rId18"/>
+    <p:sldId id="273" r:id="rId19"/>
+    <p:sldId id="274" r:id="rId20"/>
+    <p:sldId id="275" r:id="rId21"/>
+    <p:sldId id="276" r:id="rId22"/>
+    <p:sldId id="277" r:id="rId23"/>
+    <p:sldId id="278" r:id="rId24"/>
   </p:sldIdLst>
   <p:sldSz cx="9144000" cy="6858000" type="screen4x3"/>
   <p:notesSz cx="6858000" cy="9144000"/>
@@ -211,7 +214,7 @@
           <a:p>
             <a:fld id="{1F8D9F27-42FB-4FE0-B36E-06650DE9A7F9}" type="datetimeFigureOut">
               <a:rPr lang="en-US" smtClean="0"/>
-              <a:t>4/25/2013</a:t>
+              <a:t>5/16/2013</a:t>
             </a:fld>
             <a:endParaRPr lang="en-US"/>
           </a:p>
@@ -979,7 +982,7 @@
           <a:p>
             <a:fld id="{597A8BB0-0AB3-4FB9-9145-BB96589ECA58}" type="datetimeFigureOut">
               <a:rPr lang="en-US" smtClean="0"/>
-              <a:t>4/25/2013</a:t>
+              <a:t>5/16/2013</a:t>
             </a:fld>
             <a:endParaRPr lang="en-US"/>
           </a:p>
@@ -1149,7 +1152,7 @@
           <a:p>
             <a:fld id="{597A8BB0-0AB3-4FB9-9145-BB96589ECA58}" type="datetimeFigureOut">
               <a:rPr lang="en-US" smtClean="0"/>
-              <a:t>4/25/2013</a:t>
+              <a:t>5/16/2013</a:t>
             </a:fld>
             <a:endParaRPr lang="en-US"/>
           </a:p>
@@ -1329,7 +1332,7 @@
           <a:p>
             <a:fld id="{597A8BB0-0AB3-4FB9-9145-BB96589ECA58}" type="datetimeFigureOut">
               <a:rPr lang="en-US" smtClean="0"/>
-              <a:t>4/25/2013</a:t>
+              <a:t>5/16/2013</a:t>
             </a:fld>
             <a:endParaRPr lang="en-US"/>
           </a:p>
@@ -1499,7 +1502,7 @@
           <a:p>
             <a:fld id="{597A8BB0-0AB3-4FB9-9145-BB96589ECA58}" type="datetimeFigureOut">
               <a:rPr lang="en-US" smtClean="0"/>
-              <a:t>4/25/2013</a:t>
+              <a:t>5/16/2013</a:t>
             </a:fld>
             <a:endParaRPr lang="en-US"/>
           </a:p>
@@ -1745,7 +1748,7 @@
           <a:p>
             <a:fld id="{597A8BB0-0AB3-4FB9-9145-BB96589ECA58}" type="datetimeFigureOut">
               <a:rPr lang="en-US" smtClean="0"/>
-              <a:t>4/25/2013</a:t>
+              <a:t>5/16/2013</a:t>
             </a:fld>
             <a:endParaRPr lang="en-US"/>
           </a:p>
@@ -2033,7 +2036,7 @@
           <a:p>
             <a:fld id="{597A8BB0-0AB3-4FB9-9145-BB96589ECA58}" type="datetimeFigureOut">
               <a:rPr lang="en-US" smtClean="0"/>
-              <a:t>4/25/2013</a:t>
+              <a:t>5/16/2013</a:t>
             </a:fld>
             <a:endParaRPr lang="en-US"/>
           </a:p>
@@ -2455,7 +2458,7 @@
           <a:p>
             <a:fld id="{597A8BB0-0AB3-4FB9-9145-BB96589ECA58}" type="datetimeFigureOut">
               <a:rPr lang="en-US" smtClean="0"/>
-              <a:t>4/25/2013</a:t>
+              <a:t>5/16/2013</a:t>
             </a:fld>
             <a:endParaRPr lang="en-US"/>
           </a:p>
@@ -2573,7 +2576,7 @@
           <a:p>
             <a:fld id="{597A8BB0-0AB3-4FB9-9145-BB96589ECA58}" type="datetimeFigureOut">
               <a:rPr lang="en-US" smtClean="0"/>
-              <a:t>4/25/2013</a:t>
+              <a:t>5/16/2013</a:t>
             </a:fld>
             <a:endParaRPr lang="en-US"/>
           </a:p>
@@ -2668,7 +2671,7 @@
           <a:p>
             <a:fld id="{597A8BB0-0AB3-4FB9-9145-BB96589ECA58}" type="datetimeFigureOut">
               <a:rPr lang="en-US" smtClean="0"/>
-              <a:t>4/25/2013</a:t>
+              <a:t>5/16/2013</a:t>
             </a:fld>
             <a:endParaRPr lang="en-US"/>
           </a:p>
@@ -2945,7 +2948,7 @@
           <a:p>
             <a:fld id="{597A8BB0-0AB3-4FB9-9145-BB96589ECA58}" type="datetimeFigureOut">
               <a:rPr lang="en-US" smtClean="0"/>
-              <a:t>4/25/2013</a:t>
+              <a:t>5/16/2013</a:t>
             </a:fld>
             <a:endParaRPr lang="en-US"/>
           </a:p>
@@ -3198,7 +3201,7 @@
           <a:p>
             <a:fld id="{597A8BB0-0AB3-4FB9-9145-BB96589ECA58}" type="datetimeFigureOut">
               <a:rPr lang="en-US" smtClean="0"/>
-              <a:t>4/25/2013</a:t>
+              <a:t>5/16/2013</a:t>
             </a:fld>
             <a:endParaRPr lang="en-US"/>
           </a:p>
@@ -3411,7 +3414,7 @@
           <a:p>
             <a:fld id="{597A8BB0-0AB3-4FB9-9145-BB96589ECA58}" type="datetimeFigureOut">
               <a:rPr lang="en-US" smtClean="0"/>
-              <a:t>4/25/2013</a:t>
+              <a:t>5/16/2013</a:t>
             </a:fld>
             <a:endParaRPr lang="en-US"/>
           </a:p>
@@ -3832,11 +3835,7 @@
           <a:p>
             <a:r>
               <a:rPr lang="en-US" dirty="0" smtClean="0"/>
-              <a:t>14 </a:t>
-            </a:r>
-            <a:r>
-              <a:rPr lang="en-US" dirty="0" smtClean="0"/>
-              <a:t>May 2013</a:t>
+              <a:t>14 May 2013</a:t>
             </a:r>
             <a:endParaRPr lang="en-US" dirty="0"/>
           </a:p>
@@ -4030,7 +4029,7 @@
     </p:spTree>
     <p:extLst>
       <p:ext uri="{BB962C8B-B14F-4D97-AF65-F5344CB8AC3E}">
-        <p14:creationId xmlns:p14="http://schemas.microsoft.com/office/powerpoint/2010/main" val="3686789828"/>
+        <p14:creationId xmlns:p14="http://schemas.microsoft.com/office/powerpoint/2010/main" val="1256088030"/>
       </p:ext>
     </p:extLst>
   </p:cSld>
@@ -4715,7 +4714,7 @@
     </p:spTree>
     <p:extLst>
       <p:ext uri="{BB962C8B-B14F-4D97-AF65-F5344CB8AC3E}">
-        <p14:creationId xmlns:p14="http://schemas.microsoft.com/office/powerpoint/2010/main" val="3302186018"/>
+        <p14:creationId xmlns:p14="http://schemas.microsoft.com/office/powerpoint/2010/main" val="3767041149"/>
       </p:ext>
     </p:extLst>
   </p:cSld>
@@ -5476,7 +5475,7 @@
     </p:spTree>
     <p:extLst>
       <p:ext uri="{BB962C8B-B14F-4D97-AF65-F5344CB8AC3E}">
-        <p14:creationId xmlns:p14="http://schemas.microsoft.com/office/powerpoint/2010/main" val="3117417146"/>
+        <p14:creationId xmlns:p14="http://schemas.microsoft.com/office/powerpoint/2010/main" val="3723303219"/>
       </p:ext>
     </p:extLst>
   </p:cSld>
@@ -5862,7 +5861,7 @@
     </p:spTree>
     <p:extLst>
       <p:ext uri="{BB962C8B-B14F-4D97-AF65-F5344CB8AC3E}">
-        <p14:creationId xmlns:p14="http://schemas.microsoft.com/office/powerpoint/2010/main" val="2159828873"/>
+        <p14:creationId xmlns:p14="http://schemas.microsoft.com/office/powerpoint/2010/main" val="3478594361"/>
       </p:ext>
     </p:extLst>
   </p:cSld>
@@ -6336,7 +6335,7 @@
     </p:spTree>
     <p:extLst>
       <p:ext uri="{BB962C8B-B14F-4D97-AF65-F5344CB8AC3E}">
-        <p14:creationId xmlns:p14="http://schemas.microsoft.com/office/powerpoint/2010/main" val="1018750493"/>
+        <p14:creationId xmlns:p14="http://schemas.microsoft.com/office/powerpoint/2010/main" val="1087586795"/>
       </p:ext>
     </p:extLst>
   </p:cSld>
@@ -6661,7 +6660,7 @@
     </p:spTree>
     <p:extLst>
       <p:ext uri="{BB962C8B-B14F-4D97-AF65-F5344CB8AC3E}">
-        <p14:creationId xmlns:p14="http://schemas.microsoft.com/office/powerpoint/2010/main" val="2824666289"/>
+        <p14:creationId xmlns:p14="http://schemas.microsoft.com/office/powerpoint/2010/main" val="81725269"/>
       </p:ext>
     </p:extLst>
   </p:cSld>
@@ -7094,7 +7093,7 @@
     </p:spTree>
     <p:extLst>
       <p:ext uri="{BB962C8B-B14F-4D97-AF65-F5344CB8AC3E}">
-        <p14:creationId xmlns:p14="http://schemas.microsoft.com/office/powerpoint/2010/main" val="2960129460"/>
+        <p14:creationId xmlns:p14="http://schemas.microsoft.com/office/powerpoint/2010/main" val="2336178255"/>
       </p:ext>
     </p:extLst>
   </p:cSld>
@@ -7157,7 +7156,7 @@
         <p:spPr/>
         <p:txBody>
           <a:bodyPr>
-            <a:normAutofit fontScale="70000" lnSpcReduction="20000"/>
+            <a:normAutofit/>
           </a:bodyPr>
           <a:lstStyle/>
           <a:p>
@@ -7181,12 +7180,16 @@
               <a:t> tls-policy-example.jar </a:t>
             </a:r>
             <a:r>
-              <a:rPr lang="en-US" b="1" dirty="0" err="1"/>
-              <a:t>example.MainWithBrowserTlsPolicy</a:t>
+              <a:rPr lang="en-US" b="1" dirty="0" err="1" smtClean="0"/>
+              <a:t>example.MainWithStrictTlsPolicy</a:t>
+            </a:r>
+            <a:r>
+              <a:rPr lang="en-US" b="1" dirty="0" smtClean="0"/>
+              <a:t> </a:t>
             </a:r>
             <a:r>
               <a:rPr lang="en-US" b="1" dirty="0"/>
-              <a:t> https://www.google.com</a:t>
+              <a:t>https://www.google.com</a:t>
             </a:r>
             <a:endParaRPr lang="en-US" dirty="0"/>
           </a:p>
@@ -7196,153 +7199,32 @@
             </a:pPr>
             <a:r>
               <a:rPr lang="en-US" dirty="0"/>
-              <a:t>The server certificate could not be validated</a:t>
-            </a:r>
-          </a:p>
-          <a:p>
-            <a:pPr marL="0" indent="0">
-              <a:buNone/>
-            </a:pPr>
-            <a:r>
-              <a:rPr lang="en-US" dirty="0"/>
-              <a:t>Issuer: OU=Equifax Secure Certificate </a:t>
+              <a:t>ERROR: </a:t>
             </a:r>
             <a:r>
               <a:rPr lang="en-US" dirty="0" err="1"/>
-              <a:t>Authority,O</a:t>
-            </a:r>
-            <a:r>
-              <a:rPr lang="en-US" dirty="0"/>
-              <a:t>=</a:t>
+              <a:t>javax.net.ssl.SSLHandshakeException</a:t>
+            </a:r>
+            <a:r>
+              <a:rPr lang="en-US" dirty="0"/>
+              <a:t>: </a:t>
             </a:r>
             <a:r>
               <a:rPr lang="en-US" dirty="0" err="1"/>
-              <a:t>Equifax,C</a:t>
-            </a:r>
-            <a:r>
-              <a:rPr lang="en-US" dirty="0"/>
-              <a:t>=US</a:t>
-            </a:r>
-          </a:p>
-          <a:p>
-            <a:pPr marL="0" indent="0">
-              <a:buNone/>
-            </a:pPr>
-            <a:r>
-              <a:rPr lang="en-US" dirty="0"/>
-              <a:t>Subject: CN=Google Internet </a:t>
-            </a:r>
-            <a:r>
-              <a:rPr lang="en-US" dirty="0" err="1"/>
-              <a:t>Authority,O</a:t>
-            </a:r>
-            <a:r>
-              <a:rPr lang="en-US" dirty="0"/>
-              <a:t>=Google </a:t>
-            </a:r>
-            <a:r>
-              <a:rPr lang="en-US" dirty="0" err="1"/>
-              <a:t>Inc,C</a:t>
-            </a:r>
-            <a:r>
-              <a:rPr lang="en-US" dirty="0"/>
-              <a:t>=US</a:t>
-            </a:r>
-          </a:p>
-          <a:p>
-            <a:pPr marL="0" indent="0">
-              <a:buNone/>
-            </a:pPr>
-            <a:r>
-              <a:rPr lang="en-US" dirty="0"/>
-              <a:t>Type:X.509</a:t>
-            </a:r>
-          </a:p>
-          <a:p>
-            <a:pPr marL="0" indent="0">
-              <a:buNone/>
-            </a:pPr>
-            <a:r>
-              <a:rPr lang="en-US" dirty="0"/>
-              <a:t>Not valid before: Wed Dec 12 07:58:50 PST 2012</a:t>
-            </a:r>
-          </a:p>
-          <a:p>
-            <a:pPr marL="0" indent="0">
-              <a:buNone/>
-            </a:pPr>
-            <a:r>
-              <a:rPr lang="en-US" dirty="0"/>
-              <a:t>Not valid after: Tue Dec 31 07:58:50 PST 2013</a:t>
-            </a:r>
-          </a:p>
-          <a:p>
-            <a:pPr marL="0" indent="0">
-              <a:buNone/>
-            </a:pPr>
-            <a:r>
-              <a:rPr lang="en-US" dirty="0"/>
-              <a:t>Serial number: 1406945</a:t>
-            </a:r>
-          </a:p>
-          <a:p>
-            <a:pPr marL="0" indent="0">
-              <a:buNone/>
-            </a:pPr>
-            <a:r>
-              <a:rPr lang="en-US" dirty="0"/>
-              <a:t>SHA1 Fingerprint: 59676e6bdd9f4d9ddae6a15d9dbcdf24357cf776</a:t>
-            </a:r>
-          </a:p>
-          <a:p>
-            <a:pPr marL="0" indent="0">
-              <a:buNone/>
-            </a:pPr>
-            <a:r>
-              <a:rPr lang="en-US" dirty="0"/>
-              <a:t>Accept this certificate? [Y/N] </a:t>
-            </a:r>
-            <a:r>
-              <a:rPr lang="en-US" b="1" dirty="0">
+              <a:t>java.security.cert.CertificateException</a:t>
+            </a:r>
+            <a:r>
+              <a:rPr lang="en-US" dirty="0"/>
+              <a:t>: </a:t>
+            </a:r>
+            <a:r>
+              <a:rPr lang="en-US" dirty="0">
                 <a:solidFill>
                   <a:srgbClr val="FF0000"/>
                 </a:solidFill>
               </a:rPr>
-              <a:t>y</a:t>
-            </a:r>
-            <a:endParaRPr lang="en-US" dirty="0">
-              <a:solidFill>
-                <a:srgbClr val="FF0000"/>
-              </a:solidFill>
-            </a:endParaRPr>
-          </a:p>
-          <a:p>
-            <a:pPr marL="0" indent="0">
-              <a:buNone/>
-            </a:pPr>
-            <a:r>
-              <a:rPr lang="en-US" dirty="0"/>
-              <a:t>Save this certificate permanently? [Y/N] </a:t>
-            </a:r>
-            <a:r>
-              <a:rPr lang="en-US" b="1" dirty="0">
-                <a:solidFill>
-                  <a:srgbClr val="FF0000"/>
-                </a:solidFill>
-              </a:rPr>
-              <a:t>y</a:t>
-            </a:r>
-            <a:endParaRPr lang="en-US" dirty="0">
-              <a:solidFill>
-                <a:srgbClr val="FF0000"/>
-              </a:solidFill>
-            </a:endParaRPr>
-          </a:p>
-          <a:p>
-            <a:pPr marL="0" indent="0">
-              <a:buNone/>
-            </a:pPr>
-            <a:endParaRPr lang="en-US" dirty="0"/>
+              <a:t>Server certificate is not trusted</a:t>
+            </a:r>
           </a:p>
         </p:txBody>
       </p:sp>
@@ -7354,8 +7236,8 @@
         </p:nvSpPr>
         <p:spPr>
           <a:xfrm>
-            <a:off x="3276600" y="5955268"/>
-            <a:ext cx="5428089" cy="369332"/>
+            <a:off x="4495800" y="5257800"/>
+            <a:ext cx="4464748" cy="1477328"/>
           </a:xfrm>
           <a:prstGeom prst="rect">
             <a:avLst/>
@@ -7368,7 +7250,7 @@
           </a:ln>
         </p:spPr>
         <p:txBody>
-          <a:bodyPr wrap="none" rtlCol="0">
+          <a:bodyPr wrap="square" rtlCol="0">
             <a:spAutoFit/>
           </a:bodyPr>
           <a:lstStyle/>
@@ -7411,7 +7293,7 @@
                   <a:srgbClr val="FF0000"/>
                 </a:solidFill>
               </a:rPr>
-              <a:t>TlsPolicyCommon.consoleBrowser</a:t>
+              <a:t>TlsPolicyBuilder.factory</a:t>
             </a:r>
             <a:r>
               <a:rPr lang="en-US" dirty="0" smtClean="0">
@@ -7419,20 +7301,119 @@
                   <a:srgbClr val="FF0000"/>
                 </a:solidFill>
               </a:rPr>
-              <a:t>();</a:t>
-            </a:r>
-            <a:endParaRPr lang="en-US" dirty="0">
-              <a:solidFill>
-                <a:srgbClr val="FF0000"/>
-              </a:solidFill>
-            </a:endParaRPr>
+              <a:t>()</a:t>
+            </a:r>
+          </a:p>
+          <a:p>
+            <a:r>
+              <a:rPr lang="en-US" dirty="0" smtClean="0">
+                <a:solidFill>
+                  <a:srgbClr val="FF0000"/>
+                </a:solidFill>
+              </a:rPr>
+              <a:t>.</a:t>
+            </a:r>
+            <a:r>
+              <a:rPr lang="en-US" dirty="0" err="1">
+                <a:solidFill>
+                  <a:srgbClr val="FF0000"/>
+                </a:solidFill>
+              </a:rPr>
+              <a:t>providesAuthentication</a:t>
+            </a:r>
+            <a:r>
+              <a:rPr lang="en-US" dirty="0" smtClean="0">
+                <a:solidFill>
+                  <a:srgbClr val="FF0000"/>
+                </a:solidFill>
+              </a:rPr>
+              <a:t>()</a:t>
+            </a:r>
+          </a:p>
+          <a:p>
+            <a:r>
+              <a:rPr lang="en-US" dirty="0" smtClean="0">
+                <a:solidFill>
+                  <a:srgbClr val="FF0000"/>
+                </a:solidFill>
+              </a:rPr>
+              <a:t>.</a:t>
+            </a:r>
+            <a:r>
+              <a:rPr lang="en-US" dirty="0" err="1">
+                <a:solidFill>
+                  <a:srgbClr val="FF0000"/>
+                </a:solidFill>
+              </a:rPr>
+              <a:t>providesConfidentiality</a:t>
+            </a:r>
+            <a:r>
+              <a:rPr lang="en-US" dirty="0" smtClean="0">
+                <a:solidFill>
+                  <a:srgbClr val="FF0000"/>
+                </a:solidFill>
+              </a:rPr>
+              <a:t>()</a:t>
+            </a:r>
+          </a:p>
+          <a:p>
+            <a:r>
+              <a:rPr lang="en-US" dirty="0" smtClean="0">
+                <a:solidFill>
+                  <a:srgbClr val="FF0000"/>
+                </a:solidFill>
+              </a:rPr>
+              <a:t>.</a:t>
+            </a:r>
+            <a:r>
+              <a:rPr lang="en-US" dirty="0" err="1">
+                <a:solidFill>
+                  <a:srgbClr val="FF0000"/>
+                </a:solidFill>
+              </a:rPr>
+              <a:t>providesIntegrity</a:t>
+            </a:r>
+            <a:r>
+              <a:rPr lang="en-US" dirty="0" smtClean="0">
+                <a:solidFill>
+                  <a:srgbClr val="FF0000"/>
+                </a:solidFill>
+              </a:rPr>
+              <a:t>()</a:t>
+            </a:r>
+          </a:p>
+          <a:p>
+            <a:r>
+              <a:rPr lang="en-US" dirty="0" smtClean="0">
+                <a:solidFill>
+                  <a:srgbClr val="FF0000"/>
+                </a:solidFill>
+              </a:rPr>
+              <a:t>.</a:t>
+            </a:r>
+            <a:r>
+              <a:rPr lang="en-US" dirty="0" err="1">
+                <a:solidFill>
+                  <a:srgbClr val="FF0000"/>
+                </a:solidFill>
+              </a:rPr>
+              <a:t>certificateRepository</a:t>
+            </a:r>
+            <a:r>
+              <a:rPr lang="en-US" dirty="0">
+                <a:solidFill>
+                  <a:srgbClr val="FF0000"/>
+                </a:solidFill>
+              </a:rPr>
+              <a:t>(repository).build();</a:t>
+            </a:r>
           </a:p>
         </p:txBody>
       </p:sp>
     </p:spTree>
     <p:extLst>
       <p:ext uri="{BB962C8B-B14F-4D97-AF65-F5344CB8AC3E}">
-        <p14:creationId xmlns:p14="http://schemas.microsoft.com/office/powerpoint/2010/main" val="2463166751"/>
+        <p14:creationId xmlns:p14="http://schemas.microsoft.com/office/powerpoint/2010/main" val="168315915"/>
       </p:ext>
     </p:extLst>
   </p:cSld>
@@ -7495,7 +7476,7 @@
         <p:spPr/>
         <p:txBody>
           <a:bodyPr>
-            <a:normAutofit fontScale="32500" lnSpcReduction="20000"/>
+            <a:normAutofit fontScale="70000" lnSpcReduction="20000"/>
           </a:bodyPr>
           <a:lstStyle/>
           <a:p>
@@ -7503,33 +7484,38 @@
               <a:buNone/>
             </a:pPr>
             <a:r>
-              <a:rPr lang="en-US" sz="5500" dirty="0"/>
+              <a:rPr lang="en-US" dirty="0"/>
               <a:t>C:\&gt; </a:t>
             </a:r>
             <a:r>
-              <a:rPr lang="en-US" sz="5500" b="1" dirty="0"/>
-              <a:t>type </a:t>
-            </a:r>
-            <a:r>
-              <a:rPr lang="en-US" sz="5500" b="1" dirty="0" smtClean="0"/>
-              <a:t>trusted-</a:t>
-            </a:r>
-            <a:r>
-              <a:rPr lang="en-US" sz="5500" b="1" dirty="0" err="1" smtClean="0"/>
-              <a:t>certs.pem</a:t>
-            </a:r>
-            <a:endParaRPr lang="en-US" sz="5500" b="1" dirty="0"/>
+              <a:rPr lang="en-US" b="1" dirty="0"/>
+              <a:t>java -</a:t>
+            </a:r>
+            <a:r>
+              <a:rPr lang="en-US" b="1" dirty="0" err="1"/>
+              <a:t>cp</a:t>
+            </a:r>
+            <a:r>
+              <a:rPr lang="en-US" b="1" dirty="0"/>
+              <a:t> tls-policy-example.jar </a:t>
+            </a:r>
+            <a:r>
+              <a:rPr lang="en-US" b="1" dirty="0" err="1"/>
+              <a:t>example.MainWithBrowserTlsPolicy</a:t>
+            </a:r>
+            <a:r>
+              <a:rPr lang="en-US" b="1" dirty="0"/>
+              <a:t> https://www.google.com</a:t>
+            </a:r>
+            <a:endParaRPr lang="en-US" dirty="0"/>
           </a:p>
           <a:p>
             <a:pPr marL="0" indent="0">
               <a:buNone/>
             </a:pPr>
             <a:r>
-              <a:rPr lang="en-US" sz="4000" dirty="0">
-                <a:latin typeface="Courier New" pitchFamily="49" charset="0"/>
-                <a:cs typeface="Courier New" pitchFamily="49" charset="0"/>
-              </a:rPr>
-              <a:t>-----BEGIN CERTIFICATE-----</a:t>
+              <a:rPr lang="en-US" dirty="0"/>
+              <a:t>The server certificate could not be validated</a:t>
             </a:r>
           </a:p>
           <a:p>
@@ -7537,11 +7523,24 @@
               <a:buNone/>
             </a:pPr>
             <a:r>
-              <a:rPr lang="en-US" sz="4000" dirty="0">
-                <a:latin typeface="Courier New" pitchFamily="49" charset="0"/>
-                <a:cs typeface="Courier New" pitchFamily="49" charset="0"/>
-              </a:rPr>
-              <a:t>MIICsDCCAhmgAwIBAgIDFXfhMA0GCSqGSIb3DQEBBQUAME4xCzAJBgNVBAYTAlVTMRAwDgYDVQQK</a:t>
+              <a:rPr lang="en-US" dirty="0"/>
+              <a:t>Issuer: OU=Equifax Secure Certificate </a:t>
+            </a:r>
+            <a:r>
+              <a:rPr lang="en-US" dirty="0" err="1"/>
+              <a:t>Authority,O</a:t>
+            </a:r>
+            <a:r>
+              <a:rPr lang="en-US" dirty="0"/>
+              <a:t>=</a:t>
+            </a:r>
+            <a:r>
+              <a:rPr lang="en-US" dirty="0" err="1"/>
+              <a:t>Equifax,C</a:t>
+            </a:r>
+            <a:r>
+              <a:rPr lang="en-US" dirty="0"/>
+              <a:t>=US</a:t>
             </a:r>
           </a:p>
           <a:p>
@@ -7549,11 +7548,24 @@
               <a:buNone/>
             </a:pPr>
             <a:r>
-              <a:rPr lang="en-US" sz="4000" dirty="0">
-                <a:latin typeface="Courier New" pitchFamily="49" charset="0"/>
-                <a:cs typeface="Courier New" pitchFamily="49" charset="0"/>
-              </a:rPr>
-              <a:t>EwdFcXVpZmF4MS0wKwYDVQQLEyRFcXVpZmF4IFNlY3VyZSBDZXJ0aWZpY2F0ZSBBdXRob3JpdHkw</a:t>
+              <a:rPr lang="en-US" dirty="0"/>
+              <a:t>Subject: CN=Google Internet </a:t>
+            </a:r>
+            <a:r>
+              <a:rPr lang="en-US" dirty="0" err="1"/>
+              <a:t>Authority,O</a:t>
+            </a:r>
+            <a:r>
+              <a:rPr lang="en-US" dirty="0"/>
+              <a:t>=Google </a:t>
+            </a:r>
+            <a:r>
+              <a:rPr lang="en-US" dirty="0" err="1"/>
+              <a:t>Inc,C</a:t>
+            </a:r>
+            <a:r>
+              <a:rPr lang="en-US" dirty="0"/>
+              <a:t>=US</a:t>
             </a:r>
           </a:p>
           <a:p>
@@ -7561,11 +7573,8 @@
               <a:buNone/>
             </a:pPr>
             <a:r>
-              <a:rPr lang="en-US" sz="4000" dirty="0">
-                <a:latin typeface="Courier New" pitchFamily="49" charset="0"/>
-                <a:cs typeface="Courier New" pitchFamily="49" charset="0"/>
-              </a:rPr>
-              <a:t>HhcNMTIxMjEyMTU1ODUwWhcNMTMxMjMxMTU1ODUwWjBGMQswCQYDVQQGEwJVUzETMBEGA1UEChMK</a:t>
+              <a:rPr lang="en-US" dirty="0"/>
+              <a:t>Type:X.509</a:t>
             </a:r>
           </a:p>
           <a:p>
@@ -7573,11 +7582,8 @@
               <a:buNone/>
             </a:pPr>
             <a:r>
-              <a:rPr lang="en-US" sz="4000" dirty="0">
-                <a:latin typeface="Courier New" pitchFamily="49" charset="0"/>
-                <a:cs typeface="Courier New" pitchFamily="49" charset="0"/>
-              </a:rPr>
-              <a:t>R29vZ2xlIEluYzEiMCAGA1UEAxMZR29vZ2xlIEludGVybmV0IEF1dGhvcml0eTCBnzANBgkqhkiG</a:t>
+              <a:rPr lang="en-US" dirty="0"/>
+              <a:t>Not valid before: Wed Dec 12 07:58:50 PST 2012</a:t>
             </a:r>
           </a:p>
           <a:p>
@@ -7585,11 +7591,8 @@
               <a:buNone/>
             </a:pPr>
             <a:r>
-              <a:rPr lang="en-US" sz="4000" dirty="0">
-                <a:latin typeface="Courier New" pitchFamily="49" charset="0"/>
-                <a:cs typeface="Courier New" pitchFamily="49" charset="0"/>
-              </a:rPr>
-              <a:t>9w0BAQEFAAOBjQAwgYkCgYEAye23pIucV+eEPkB9hPSP0XFjU5nneXQUr0SZMyCSjXvlKAy6rWxJ</a:t>
+              <a:rPr lang="en-US" dirty="0"/>
+              <a:t>Not valid after: Tue Dec 31 07:58:50 PST 2013</a:t>
             </a:r>
           </a:p>
           <a:p>
@@ -7597,11 +7600,8 @@
               <a:buNone/>
             </a:pPr>
             <a:r>
-              <a:rPr lang="en-US" sz="4000" dirty="0">
-                <a:latin typeface="Courier New" pitchFamily="49" charset="0"/>
-                <a:cs typeface="Courier New" pitchFamily="49" charset="0"/>
-              </a:rPr>
-              <a:t>foNfNFlOCnowzdDXxFdF7dWq1nMmzq0yE7jXDx07393cCDaob1FEm8rWIFJztyaHNWrbqeXUWaUr</a:t>
+              <a:rPr lang="en-US" dirty="0"/>
+              <a:t>Serial number: 1406945</a:t>
             </a:r>
           </a:p>
           <a:p>
@@ -7609,11 +7609,8 @@
               <a:buNone/>
             </a:pPr>
             <a:r>
-              <a:rPr lang="en-US" sz="4000" dirty="0">
-                <a:latin typeface="Courier New" pitchFamily="49" charset="0"/>
-                <a:cs typeface="Courier New" pitchFamily="49" charset="0"/>
-              </a:rPr>
-              <a:t>/GcZOfqTGBhs3t0lig4zFEfC7wFQeeT9adGnwKziV28CAwEAAaOBozCBoDAfBgNVHSMEGDAWgBRI</a:t>
+              <a:rPr lang="en-US" dirty="0"/>
+              <a:t>SHA1 Fingerprint: 59676e6bdd9f4d9ddae6a15d9dbcdf24357cf776</a:t>
             </a:r>
           </a:p>
           <a:p>
@@ -7621,98 +7618,44 @@
               <a:buNone/>
             </a:pPr>
             <a:r>
-              <a:rPr lang="en-US" sz="4000" dirty="0">
-                <a:latin typeface="Courier New" pitchFamily="49" charset="0"/>
-                <a:cs typeface="Courier New" pitchFamily="49" charset="0"/>
-              </a:rPr>
-              <a:t>5mj5K9KylddH2CMgEE8zmJCf1DAdBgNVHQ4EFgQUv8Aw6/VDET5nup6R+/xq2uNrEiQwEgYDVR0T</a:t>
-            </a:r>
+              <a:rPr lang="en-US" dirty="0"/>
+              <a:t>Accept this certificate? [Y/N] </a:t>
+            </a:r>
+            <a:r>
+              <a:rPr lang="en-US" b="1" dirty="0">
+                <a:solidFill>
+                  <a:srgbClr val="FF0000"/>
+                </a:solidFill>
+              </a:rPr>
+              <a:t>y</a:t>
+            </a:r>
+            <a:endParaRPr lang="en-US" dirty="0">
+              <a:solidFill>
+                <a:srgbClr val="FF0000"/>
+              </a:solidFill>
+            </a:endParaRPr>
           </a:p>
           <a:p>
             <a:pPr marL="0" indent="0">
               <a:buNone/>
             </a:pPr>
             <a:r>
-              <a:rPr lang="en-US" sz="4000" dirty="0">
-                <a:latin typeface="Courier New" pitchFamily="49" charset="0"/>
-                <a:cs typeface="Courier New" pitchFamily="49" charset="0"/>
-              </a:rPr>
-              <a:t>AQH/</a:t>
-            </a:r>
-            <a:r>
-              <a:rPr lang="en-US" sz="4000" dirty="0" err="1">
-                <a:latin typeface="Courier New" pitchFamily="49" charset="0"/>
-                <a:cs typeface="Courier New" pitchFamily="49" charset="0"/>
-              </a:rPr>
-              <a:t>BAgwBgEB</a:t>
-            </a:r>
-            <a:r>
-              <a:rPr lang="en-US" sz="4000" dirty="0">
-                <a:latin typeface="Courier New" pitchFamily="49" charset="0"/>
-                <a:cs typeface="Courier New" pitchFamily="49" charset="0"/>
-              </a:rPr>
-              <a:t>/wIBADAOBgNVHQ8BAf8EBAMCAQYwOgYDVR0fBDMwMTAvoC2gK4YpaHR0cDovL2Ny</a:t>
-            </a:r>
-          </a:p>
-          <a:p>
-            <a:pPr marL="0" indent="0">
-              <a:buNone/>
-            </a:pPr>
-            <a:r>
-              <a:rPr lang="en-US" sz="4000" dirty="0">
-                <a:latin typeface="Courier New" pitchFamily="49" charset="0"/>
-                <a:cs typeface="Courier New" pitchFamily="49" charset="0"/>
-              </a:rPr>
-              <a:t>bC5nZW90cnVzdC5jb20vY3Jscy9zZWN1cmVjYS5jcmwwDQYJKoZIhvcNAQEFBQADgYEAvprjecFG</a:t>
-            </a:r>
-          </a:p>
-          <a:p>
-            <a:pPr marL="0" indent="0">
-              <a:buNone/>
-            </a:pPr>
-            <a:r>
-              <a:rPr lang="en-US" sz="4000" dirty="0">
-                <a:latin typeface="Courier New" pitchFamily="49" charset="0"/>
-                <a:cs typeface="Courier New" pitchFamily="49" charset="0"/>
-              </a:rPr>
-              <a:t>+iJsxzEFZUNgujFQodUovxOWZshcnDW7fZ7mTlk3zpeVJrGPZzhaDhvuJjIfKqHweFB7gwB+ARlI</a:t>
-            </a:r>
-          </a:p>
-          <a:p>
-            <a:pPr marL="0" indent="0">
-              <a:buNone/>
-            </a:pPr>
-            <a:r>
-              <a:rPr lang="en-US" sz="4000" dirty="0">
-                <a:latin typeface="Courier New" pitchFamily="49" charset="0"/>
-                <a:cs typeface="Courier New" pitchFamily="49" charset="0"/>
-              </a:rPr>
-              <a:t>jNvrPq86fpVg0NOTawALkSqOUMl3MynBQO+spR7EHcRbADQ/JemfTEh2YcflvZqhEFBfurZkX0eT</a:t>
-            </a:r>
-          </a:p>
-          <a:p>
-            <a:pPr marL="0" indent="0">
-              <a:buNone/>
-            </a:pPr>
-            <a:r>
-              <a:rPr lang="en-US" sz="4000" dirty="0">
-                <a:latin typeface="Courier New" pitchFamily="49" charset="0"/>
-                <a:cs typeface="Courier New" pitchFamily="49" charset="0"/>
-              </a:rPr>
-              <a:t>ANq98ZvVfpg=</a:t>
-            </a:r>
-          </a:p>
-          <a:p>
-            <a:pPr marL="0" indent="0">
-              <a:buNone/>
-            </a:pPr>
-            <a:r>
-              <a:rPr lang="en-US" sz="4000" dirty="0">
-                <a:latin typeface="Courier New" pitchFamily="49" charset="0"/>
-                <a:cs typeface="Courier New" pitchFamily="49" charset="0"/>
-              </a:rPr>
-              <a:t>-----END CERTIFICATE-----</a:t>
-            </a:r>
+              <a:rPr lang="en-US" dirty="0"/>
+              <a:t>Save this certificate permanently? [Y/N] </a:t>
+            </a:r>
+            <a:r>
+              <a:rPr lang="en-US" b="1" dirty="0">
+                <a:solidFill>
+                  <a:srgbClr val="FF0000"/>
+                </a:solidFill>
+              </a:rPr>
+              <a:t>y</a:t>
+            </a:r>
+            <a:endParaRPr lang="en-US" dirty="0">
+              <a:solidFill>
+                <a:srgbClr val="FF0000"/>
+              </a:solidFill>
+            </a:endParaRPr>
           </a:p>
           <a:p>
             <a:pPr marL="0" indent="0">
@@ -7730,8 +7673,8 @@
         </p:nvSpPr>
         <p:spPr>
           <a:xfrm>
-            <a:off x="3657600" y="4724400"/>
-            <a:ext cx="5040226" cy="1877437"/>
+            <a:off x="3276600" y="5955268"/>
+            <a:ext cx="5428089" cy="369332"/>
           </a:xfrm>
           <a:prstGeom prst="rect">
             <a:avLst/>
@@ -7750,99 +7693,65 @@
           <a:lstStyle/>
           <a:p>
             <a:r>
+              <a:rPr lang="en-US" dirty="0" err="1">
+                <a:solidFill>
+                  <a:srgbClr val="FF0000"/>
+                </a:solidFill>
+              </a:rPr>
+              <a:t>TlsPolicy</a:t>
+            </a:r>
+            <a:r>
+              <a:rPr lang="en-US" dirty="0">
+                <a:solidFill>
+                  <a:srgbClr val="FF0000"/>
+                </a:solidFill>
+              </a:rPr>
+              <a:t> </a:t>
+            </a:r>
+            <a:r>
+              <a:rPr lang="en-US" dirty="0" err="1">
+                <a:solidFill>
+                  <a:srgbClr val="FF0000"/>
+                </a:solidFill>
+              </a:rPr>
+              <a:t>tlsPolicy</a:t>
+            </a:r>
+            <a:r>
+              <a:rPr lang="en-US" dirty="0">
+                <a:solidFill>
+                  <a:srgbClr val="FF0000"/>
+                </a:solidFill>
+              </a:rPr>
+              <a:t> = </a:t>
+            </a:r>
+            <a:r>
+              <a:rPr lang="en-US" dirty="0" err="1">
+                <a:solidFill>
+                  <a:srgbClr val="FF0000"/>
+                </a:solidFill>
+              </a:rPr>
+              <a:t>TlsPolicyCommon.consoleBrowser</a:t>
+            </a:r>
+            <a:r>
               <a:rPr lang="en-US" dirty="0" smtClean="0">
                 <a:solidFill>
                   <a:srgbClr val="FF0000"/>
                 </a:solidFill>
               </a:rPr>
-              <a:t>This is Google!</a:t>
-            </a:r>
-          </a:p>
-          <a:p>
-            <a:r>
-              <a:rPr lang="en-US" sz="1400" dirty="0"/>
-              <a:t>Issuer: OU=Equifax Secure Certificate </a:t>
-            </a:r>
-            <a:r>
-              <a:rPr lang="en-US" sz="1400" dirty="0" err="1"/>
-              <a:t>Authority,O</a:t>
-            </a:r>
-            <a:r>
-              <a:rPr lang="en-US" sz="1400" dirty="0"/>
-              <a:t>=</a:t>
-            </a:r>
-            <a:r>
-              <a:rPr lang="en-US" sz="1400" dirty="0" err="1"/>
-              <a:t>Equifax,C</a:t>
-            </a:r>
-            <a:r>
-              <a:rPr lang="en-US" sz="1400" dirty="0"/>
-              <a:t>=US</a:t>
-            </a:r>
-          </a:p>
-          <a:p>
-            <a:r>
-              <a:rPr lang="en-US" sz="1400" dirty="0"/>
-              <a:t>Subject: CN=Google Internet </a:t>
-            </a:r>
-            <a:r>
-              <a:rPr lang="en-US" sz="1400" dirty="0" err="1"/>
-              <a:t>Authority,O</a:t>
-            </a:r>
-            <a:r>
-              <a:rPr lang="en-US" sz="1400" dirty="0"/>
-              <a:t>=Google </a:t>
-            </a:r>
-            <a:r>
-              <a:rPr lang="en-US" sz="1400" dirty="0" err="1"/>
-              <a:t>Inc,C</a:t>
-            </a:r>
-            <a:r>
-              <a:rPr lang="en-US" sz="1400" dirty="0"/>
-              <a:t>=US</a:t>
-            </a:r>
-          </a:p>
-          <a:p>
-            <a:r>
-              <a:rPr lang="en-US" sz="1400" dirty="0"/>
-              <a:t>Type:X.509</a:t>
-            </a:r>
-          </a:p>
-          <a:p>
-            <a:r>
-              <a:rPr lang="en-US" sz="1400" dirty="0"/>
-              <a:t>Not valid before: Wed Dec 12 07:58:50 PST 2012</a:t>
-            </a:r>
-          </a:p>
-          <a:p>
-            <a:r>
-              <a:rPr lang="en-US" sz="1400" dirty="0"/>
-              <a:t>Not valid after: Tue Dec 31 07:58:50 PST 2013</a:t>
-            </a:r>
-          </a:p>
-          <a:p>
-            <a:r>
-              <a:rPr lang="en-US" sz="1400" dirty="0"/>
-              <a:t>Serial number: 1406945</a:t>
-            </a:r>
-          </a:p>
-          <a:p>
-            <a:r>
-              <a:rPr lang="en-US" sz="1400" dirty="0"/>
-              <a:t>SHA1 Fingerprint: </a:t>
-            </a:r>
-            <a:r>
-              <a:rPr lang="en-US" sz="1400" dirty="0" smtClean="0"/>
-              <a:t>59676e6bdd9f4d9ddae6a15d9dbcdf24357cf776</a:t>
-            </a:r>
-            <a:endParaRPr lang="en-US" sz="1400" dirty="0"/>
+              <a:t>();</a:t>
+            </a:r>
+            <a:endParaRPr lang="en-US" dirty="0">
+              <a:solidFill>
+                <a:srgbClr val="FF0000"/>
+              </a:solidFill>
+            </a:endParaRPr>
           </a:p>
         </p:txBody>
       </p:sp>
     </p:spTree>
     <p:extLst>
       <p:ext uri="{BB962C8B-B14F-4D97-AF65-F5344CB8AC3E}">
-        <p14:creationId xmlns:p14="http://schemas.microsoft.com/office/powerpoint/2010/main" val="3330487623"/>
+        <p14:creationId xmlns:p14="http://schemas.microsoft.com/office/powerpoint/2010/main" val="3298807073"/>
       </p:ext>
     </p:extLst>
   </p:cSld>
@@ -7886,7 +7795,7 @@
           <a:p>
             <a:r>
               <a:rPr lang="en-US" dirty="0" smtClean="0"/>
-              <a:t>Conclusion</a:t>
+              <a:t>Demonstration</a:t>
             </a:r>
             <a:endParaRPr lang="en-US" dirty="0"/>
           </a:p>
@@ -7905,56 +7814,354 @@
         <p:spPr/>
         <p:txBody>
           <a:bodyPr>
-            <a:normAutofit/>
+            <a:normAutofit fontScale="32500" lnSpcReduction="20000"/>
           </a:bodyPr>
           <a:lstStyle/>
           <a:p>
-            <a:r>
-              <a:rPr lang="en-US" dirty="0" smtClean="0"/>
-              <a:t>Easy to use</a:t>
-            </a:r>
-          </a:p>
-          <a:p>
-            <a:pPr lvl="1"/>
-            <a:r>
-              <a:rPr lang="en-US" dirty="0" smtClean="0"/>
-              <a:t>Typical secure or insecure client in 1 line of code</a:t>
-            </a:r>
-          </a:p>
-          <a:p>
-            <a:pPr lvl="1"/>
-            <a:r>
-              <a:rPr lang="en-US" dirty="0" smtClean="0"/>
-              <a:t>Custom secure client with 2-3 lines of code</a:t>
-            </a:r>
-          </a:p>
-          <a:p>
-            <a:r>
-              <a:rPr lang="en-US" dirty="0" smtClean="0"/>
-              <a:t>Design objectives were met</a:t>
-            </a:r>
-          </a:p>
-          <a:p>
-            <a:pPr lvl="1"/>
-            <a:r>
-              <a:rPr lang="en-US" dirty="0" smtClean="0"/>
-              <a:t>Method to create policy spells out its behavior</a:t>
-            </a:r>
-          </a:p>
-          <a:p>
-            <a:pPr lvl="1"/>
-            <a:r>
-              <a:rPr lang="en-US" dirty="0" smtClean="0"/>
-              <a:t>Type-safe options, clearly named</a:t>
-            </a:r>
+            <a:pPr marL="0" indent="0">
+              <a:buNone/>
+            </a:pPr>
+            <a:r>
+              <a:rPr lang="en-US" sz="5500" dirty="0"/>
+              <a:t>C:\&gt; </a:t>
+            </a:r>
+            <a:r>
+              <a:rPr lang="en-US" sz="5500" b="1" dirty="0"/>
+              <a:t>type </a:t>
+            </a:r>
+            <a:r>
+              <a:rPr lang="en-US" sz="5500" b="1" dirty="0" smtClean="0"/>
+              <a:t>trusted-</a:t>
+            </a:r>
+            <a:r>
+              <a:rPr lang="en-US" sz="5500" b="1" dirty="0" err="1" smtClean="0"/>
+              <a:t>certs.pem</a:t>
+            </a:r>
+            <a:endParaRPr lang="en-US" sz="5500" b="1" dirty="0"/>
+          </a:p>
+          <a:p>
+            <a:pPr marL="0" indent="0">
+              <a:buNone/>
+            </a:pPr>
+            <a:r>
+              <a:rPr lang="en-US" sz="4000" dirty="0">
+                <a:latin typeface="Courier New" pitchFamily="49" charset="0"/>
+                <a:cs typeface="Courier New" pitchFamily="49" charset="0"/>
+              </a:rPr>
+              <a:t>-----BEGIN CERTIFICATE-----</a:t>
+            </a:r>
+          </a:p>
+          <a:p>
+            <a:pPr marL="0" indent="0">
+              <a:buNone/>
+            </a:pPr>
+            <a:r>
+              <a:rPr lang="en-US" sz="4000" dirty="0">
+                <a:latin typeface="Courier New" pitchFamily="49" charset="0"/>
+                <a:cs typeface="Courier New" pitchFamily="49" charset="0"/>
+              </a:rPr>
+              <a:t>MIICsDCCAhmgAwIBAgIDFXfhMA0GCSqGSIb3DQEBBQUAME4xCzAJBgNVBAYTAlVTMRAwDgYDVQQK</a:t>
+            </a:r>
+          </a:p>
+          <a:p>
+            <a:pPr marL="0" indent="0">
+              <a:buNone/>
+            </a:pPr>
+            <a:r>
+              <a:rPr lang="en-US" sz="4000" dirty="0">
+                <a:latin typeface="Courier New" pitchFamily="49" charset="0"/>
+                <a:cs typeface="Courier New" pitchFamily="49" charset="0"/>
+              </a:rPr>
+              <a:t>EwdFcXVpZmF4MS0wKwYDVQQLEyRFcXVpZmF4IFNlY3VyZSBDZXJ0aWZpY2F0ZSBBdXRob3JpdHkw</a:t>
+            </a:r>
+          </a:p>
+          <a:p>
+            <a:pPr marL="0" indent="0">
+              <a:buNone/>
+            </a:pPr>
+            <a:r>
+              <a:rPr lang="en-US" sz="4000" dirty="0">
+                <a:latin typeface="Courier New" pitchFamily="49" charset="0"/>
+                <a:cs typeface="Courier New" pitchFamily="49" charset="0"/>
+              </a:rPr>
+              <a:t>HhcNMTIxMjEyMTU1ODUwWhcNMTMxMjMxMTU1ODUwWjBGMQswCQYDVQQGEwJVUzETMBEGA1UEChMK</a:t>
+            </a:r>
+          </a:p>
+          <a:p>
+            <a:pPr marL="0" indent="0">
+              <a:buNone/>
+            </a:pPr>
+            <a:r>
+              <a:rPr lang="en-US" sz="4000" dirty="0">
+                <a:latin typeface="Courier New" pitchFamily="49" charset="0"/>
+                <a:cs typeface="Courier New" pitchFamily="49" charset="0"/>
+              </a:rPr>
+              <a:t>R29vZ2xlIEluYzEiMCAGA1UEAxMZR29vZ2xlIEludGVybmV0IEF1dGhvcml0eTCBnzANBgkqhkiG</a:t>
+            </a:r>
+          </a:p>
+          <a:p>
+            <a:pPr marL="0" indent="0">
+              <a:buNone/>
+            </a:pPr>
+            <a:r>
+              <a:rPr lang="en-US" sz="4000" dirty="0">
+                <a:latin typeface="Courier New" pitchFamily="49" charset="0"/>
+                <a:cs typeface="Courier New" pitchFamily="49" charset="0"/>
+              </a:rPr>
+              <a:t>9w0BAQEFAAOBjQAwgYkCgYEAye23pIucV+eEPkB9hPSP0XFjU5nneXQUr0SZMyCSjXvlKAy6rWxJ</a:t>
+            </a:r>
+          </a:p>
+          <a:p>
+            <a:pPr marL="0" indent="0">
+              <a:buNone/>
+            </a:pPr>
+            <a:r>
+              <a:rPr lang="en-US" sz="4000" dirty="0">
+                <a:latin typeface="Courier New" pitchFamily="49" charset="0"/>
+                <a:cs typeface="Courier New" pitchFamily="49" charset="0"/>
+              </a:rPr>
+              <a:t>foNfNFlOCnowzdDXxFdF7dWq1nMmzq0yE7jXDx07393cCDaob1FEm8rWIFJztyaHNWrbqeXUWaUr</a:t>
+            </a:r>
+          </a:p>
+          <a:p>
+            <a:pPr marL="0" indent="0">
+              <a:buNone/>
+            </a:pPr>
+            <a:r>
+              <a:rPr lang="en-US" sz="4000" dirty="0">
+                <a:latin typeface="Courier New" pitchFamily="49" charset="0"/>
+                <a:cs typeface="Courier New" pitchFamily="49" charset="0"/>
+              </a:rPr>
+              <a:t>/GcZOfqTGBhs3t0lig4zFEfC7wFQeeT9adGnwKziV28CAwEAAaOBozCBoDAfBgNVHSMEGDAWgBRI</a:t>
+            </a:r>
+          </a:p>
+          <a:p>
+            <a:pPr marL="0" indent="0">
+              <a:buNone/>
+            </a:pPr>
+            <a:r>
+              <a:rPr lang="en-US" sz="4000" dirty="0">
+                <a:latin typeface="Courier New" pitchFamily="49" charset="0"/>
+                <a:cs typeface="Courier New" pitchFamily="49" charset="0"/>
+              </a:rPr>
+              <a:t>5mj5K9KylddH2CMgEE8zmJCf1DAdBgNVHQ4EFgQUv8Aw6/VDET5nup6R+/xq2uNrEiQwEgYDVR0T</a:t>
+            </a:r>
+          </a:p>
+          <a:p>
+            <a:pPr marL="0" indent="0">
+              <a:buNone/>
+            </a:pPr>
+            <a:r>
+              <a:rPr lang="en-US" sz="4000" dirty="0">
+                <a:latin typeface="Courier New" pitchFamily="49" charset="0"/>
+                <a:cs typeface="Courier New" pitchFamily="49" charset="0"/>
+              </a:rPr>
+              <a:t>AQH/</a:t>
+            </a:r>
+            <a:r>
+              <a:rPr lang="en-US" sz="4000" dirty="0" err="1">
+                <a:latin typeface="Courier New" pitchFamily="49" charset="0"/>
+                <a:cs typeface="Courier New" pitchFamily="49" charset="0"/>
+              </a:rPr>
+              <a:t>BAgwBgEB</a:t>
+            </a:r>
+            <a:r>
+              <a:rPr lang="en-US" sz="4000" dirty="0">
+                <a:latin typeface="Courier New" pitchFamily="49" charset="0"/>
+                <a:cs typeface="Courier New" pitchFamily="49" charset="0"/>
+              </a:rPr>
+              <a:t>/wIBADAOBgNVHQ8BAf8EBAMCAQYwOgYDVR0fBDMwMTAvoC2gK4YpaHR0cDovL2Ny</a:t>
+            </a:r>
+          </a:p>
+          <a:p>
+            <a:pPr marL="0" indent="0">
+              <a:buNone/>
+            </a:pPr>
+            <a:r>
+              <a:rPr lang="en-US" sz="4000" dirty="0">
+                <a:latin typeface="Courier New" pitchFamily="49" charset="0"/>
+                <a:cs typeface="Courier New" pitchFamily="49" charset="0"/>
+              </a:rPr>
+              <a:t>bC5nZW90cnVzdC5jb20vY3Jscy9zZWN1cmVjYS5jcmwwDQYJKoZIhvcNAQEFBQADgYEAvprjecFG</a:t>
+            </a:r>
+          </a:p>
+          <a:p>
+            <a:pPr marL="0" indent="0">
+              <a:buNone/>
+            </a:pPr>
+            <a:r>
+              <a:rPr lang="en-US" sz="4000" dirty="0">
+                <a:latin typeface="Courier New" pitchFamily="49" charset="0"/>
+                <a:cs typeface="Courier New" pitchFamily="49" charset="0"/>
+              </a:rPr>
+              <a:t>+iJsxzEFZUNgujFQodUovxOWZshcnDW7fZ7mTlk3zpeVJrGPZzhaDhvuJjIfKqHweFB7gwB+ARlI</a:t>
+            </a:r>
+          </a:p>
+          <a:p>
+            <a:pPr marL="0" indent="0">
+              <a:buNone/>
+            </a:pPr>
+            <a:r>
+              <a:rPr lang="en-US" sz="4000" dirty="0">
+                <a:latin typeface="Courier New" pitchFamily="49" charset="0"/>
+                <a:cs typeface="Courier New" pitchFamily="49" charset="0"/>
+              </a:rPr>
+              <a:t>jNvrPq86fpVg0NOTawALkSqOUMl3MynBQO+spR7EHcRbADQ/JemfTEh2YcflvZqhEFBfurZkX0eT</a:t>
+            </a:r>
+          </a:p>
+          <a:p>
+            <a:pPr marL="0" indent="0">
+              <a:buNone/>
+            </a:pPr>
+            <a:r>
+              <a:rPr lang="en-US" sz="4000" dirty="0">
+                <a:latin typeface="Courier New" pitchFamily="49" charset="0"/>
+                <a:cs typeface="Courier New" pitchFamily="49" charset="0"/>
+              </a:rPr>
+              <a:t>ANq98ZvVfpg=</a:t>
+            </a:r>
+          </a:p>
+          <a:p>
+            <a:pPr marL="0" indent="0">
+              <a:buNone/>
+            </a:pPr>
+            <a:r>
+              <a:rPr lang="en-US" sz="4000" dirty="0">
+                <a:latin typeface="Courier New" pitchFamily="49" charset="0"/>
+                <a:cs typeface="Courier New" pitchFamily="49" charset="0"/>
+              </a:rPr>
+              <a:t>-----END CERTIFICATE-----</a:t>
+            </a:r>
+          </a:p>
+          <a:p>
+            <a:pPr marL="0" indent="0">
+              <a:buNone/>
+            </a:pPr>
             <a:endParaRPr lang="en-US" dirty="0"/>
+          </a:p>
+        </p:txBody>
+      </p:sp>
+      <p:sp>
+        <p:nvSpPr>
+          <p:cNvPr id="4" name="TextBox 3"/>
+          <p:cNvSpPr txBox="1"/>
+          <p:nvPr/>
+        </p:nvSpPr>
+        <p:spPr>
+          <a:xfrm>
+            <a:off x="3657600" y="4724400"/>
+            <a:ext cx="5040226" cy="1877437"/>
+          </a:xfrm>
+          <a:prstGeom prst="rect">
+            <a:avLst/>
+          </a:prstGeom>
+          <a:noFill/>
+          <a:ln>
+            <a:solidFill>
+              <a:schemeClr val="accent2"/>
+            </a:solidFill>
+          </a:ln>
+        </p:spPr>
+        <p:txBody>
+          <a:bodyPr wrap="none" rtlCol="0">
+            <a:spAutoFit/>
+          </a:bodyPr>
+          <a:lstStyle/>
+          <a:p>
+            <a:r>
+              <a:rPr lang="en-US" dirty="0" smtClean="0">
+                <a:solidFill>
+                  <a:srgbClr val="FF0000"/>
+                </a:solidFill>
+              </a:rPr>
+              <a:t>This is Google!</a:t>
+            </a:r>
+          </a:p>
+          <a:p>
+            <a:r>
+              <a:rPr lang="en-US" sz="1400" dirty="0"/>
+              <a:t>Issuer: OU=Equifax Secure Certificate </a:t>
+            </a:r>
+            <a:r>
+              <a:rPr lang="en-US" sz="1400" dirty="0" err="1"/>
+              <a:t>Authority,O</a:t>
+            </a:r>
+            <a:r>
+              <a:rPr lang="en-US" sz="1400" dirty="0"/>
+              <a:t>=</a:t>
+            </a:r>
+            <a:r>
+              <a:rPr lang="en-US" sz="1400" dirty="0" err="1"/>
+              <a:t>Equifax,C</a:t>
+            </a:r>
+            <a:r>
+              <a:rPr lang="en-US" sz="1400" dirty="0"/>
+              <a:t>=US</a:t>
+            </a:r>
+          </a:p>
+          <a:p>
+            <a:r>
+              <a:rPr lang="en-US" sz="1400" dirty="0"/>
+              <a:t>Subject: CN=Google Internet </a:t>
+            </a:r>
+            <a:r>
+              <a:rPr lang="en-US" sz="1400" dirty="0" err="1"/>
+              <a:t>Authority,O</a:t>
+            </a:r>
+            <a:r>
+              <a:rPr lang="en-US" sz="1400" dirty="0"/>
+              <a:t>=Google </a:t>
+            </a:r>
+            <a:r>
+              <a:rPr lang="en-US" sz="1400" dirty="0" err="1"/>
+              <a:t>Inc,C</a:t>
+            </a:r>
+            <a:r>
+              <a:rPr lang="en-US" sz="1400" dirty="0"/>
+              <a:t>=US</a:t>
+            </a:r>
+          </a:p>
+          <a:p>
+            <a:r>
+              <a:rPr lang="en-US" sz="1400" dirty="0"/>
+              <a:t>Type:X.509</a:t>
+            </a:r>
+          </a:p>
+          <a:p>
+            <a:r>
+              <a:rPr lang="en-US" sz="1400" dirty="0"/>
+              <a:t>Not valid before: Wed Dec 12 07:58:50 PST 2012</a:t>
+            </a:r>
+          </a:p>
+          <a:p>
+            <a:r>
+              <a:rPr lang="en-US" sz="1400" dirty="0"/>
+              <a:t>Not valid after: Tue Dec 31 07:58:50 PST 2013</a:t>
+            </a:r>
+          </a:p>
+          <a:p>
+            <a:r>
+              <a:rPr lang="en-US" sz="1400" dirty="0"/>
+              <a:t>Serial number: 1406945</a:t>
+            </a:r>
+          </a:p>
+          <a:p>
+            <a:r>
+              <a:rPr lang="en-US" sz="1400" dirty="0"/>
+              <a:t>SHA1 Fingerprint: </a:t>
+            </a:r>
+            <a:r>
+              <a:rPr lang="en-US" sz="1400" dirty="0" smtClean="0"/>
+              <a:t>59676e6bdd9f4d9ddae6a15d9dbcdf24357cf776</a:t>
+            </a:r>
+            <a:endParaRPr lang="en-US" sz="1400" dirty="0"/>
           </a:p>
         </p:txBody>
       </p:sp>
     </p:spTree>
     <p:extLst>
       <p:ext uri="{BB962C8B-B14F-4D97-AF65-F5344CB8AC3E}">
-        <p14:creationId xmlns:p14="http://schemas.microsoft.com/office/powerpoint/2010/main" val="2422583164"/>
+        <p14:creationId xmlns:p14="http://schemas.microsoft.com/office/powerpoint/2010/main" val="2352196925"/>
       </p:ext>
     </p:extLst>
   </p:cSld>
@@ -8112,7 +8319,7 @@
     </p:spTree>
     <p:extLst>
       <p:ext uri="{BB962C8B-B14F-4D97-AF65-F5344CB8AC3E}">
-        <p14:creationId xmlns:p14="http://schemas.microsoft.com/office/powerpoint/2010/main" val="1584590240"/>
+        <p14:creationId xmlns:p14="http://schemas.microsoft.com/office/powerpoint/2010/main" val="3855042354"/>
       </p:ext>
     </p:extLst>
   </p:cSld>
@@ -8156,6 +8363,880 @@
           <a:p>
             <a:r>
               <a:rPr lang="en-US" dirty="0" smtClean="0"/>
+              <a:t>Demonstration</a:t>
+            </a:r>
+            <a:endParaRPr lang="en-US" dirty="0"/>
+          </a:p>
+        </p:txBody>
+      </p:sp>
+      <p:sp>
+        <p:nvSpPr>
+          <p:cNvPr id="3" name="Content Placeholder 2"/>
+          <p:cNvSpPr>
+            <a:spLocks noGrp="1"/>
+          </p:cNvSpPr>
+          <p:nvPr>
+            <p:ph idx="1"/>
+          </p:nvPr>
+        </p:nvSpPr>
+        <p:spPr/>
+        <p:txBody>
+          <a:bodyPr>
+            <a:normAutofit fontScale="77500" lnSpcReduction="20000"/>
+          </a:bodyPr>
+          <a:lstStyle/>
+          <a:p>
+            <a:pPr marL="0" indent="0">
+              <a:buNone/>
+            </a:pPr>
+            <a:r>
+              <a:rPr lang="en-US" dirty="0"/>
+              <a:t>C:\&gt; </a:t>
+            </a:r>
+            <a:r>
+              <a:rPr lang="en-US" b="1" dirty="0"/>
+              <a:t>java -</a:t>
+            </a:r>
+            <a:r>
+              <a:rPr lang="en-US" b="1" dirty="0" err="1"/>
+              <a:t>cp</a:t>
+            </a:r>
+            <a:r>
+              <a:rPr lang="en-US" b="1" dirty="0"/>
+              <a:t> tls-policy-example.jar </a:t>
+            </a:r>
+            <a:r>
+              <a:rPr lang="en-US" b="1" dirty="0" err="1" smtClean="0"/>
+              <a:t>example.MainWithBrowserTlsPolicy</a:t>
+            </a:r>
+            <a:r>
+              <a:rPr lang="en-US" b="1" dirty="0" smtClean="0"/>
+              <a:t> </a:t>
+            </a:r>
+            <a:r>
+              <a:rPr lang="en-US" b="1" dirty="0"/>
+              <a:t>https://www.google.com</a:t>
+            </a:r>
+            <a:endParaRPr lang="en-US" dirty="0"/>
+          </a:p>
+          <a:p>
+            <a:pPr marL="0" indent="0">
+              <a:buNone/>
+            </a:pPr>
+            <a:r>
+              <a:rPr lang="en-US" dirty="0"/>
+              <a:t>ERROR: </a:t>
+            </a:r>
+            <a:r>
+              <a:rPr lang="en-US" dirty="0" err="1"/>
+              <a:t>javax.net.ssl.SSLHandshakeException</a:t>
+            </a:r>
+            <a:r>
+              <a:rPr lang="en-US" dirty="0"/>
+              <a:t>: </a:t>
+            </a:r>
+            <a:r>
+              <a:rPr lang="en-US" dirty="0" err="1"/>
+              <a:t>java.security.cert.CertificateException</a:t>
+            </a:r>
+            <a:r>
+              <a:rPr lang="en-US" dirty="0"/>
+              <a:t>: Server certificate chain is invalid: cannot verify that CN=</a:t>
+            </a:r>
+            <a:r>
+              <a:rPr lang="en-US" dirty="0" err="1"/>
+              <a:t>AddTrust</a:t>
+            </a:r>
+            <a:r>
+              <a:rPr lang="en-US" dirty="0"/>
+              <a:t> </a:t>
+            </a:r>
+            <a:r>
+              <a:rPr lang="en-US" dirty="0" smtClean="0"/>
+              <a:t>External </a:t>
+            </a:r>
+            <a:r>
+              <a:rPr lang="en-US" dirty="0"/>
+              <a:t>CA </a:t>
+            </a:r>
+            <a:r>
+              <a:rPr lang="en-US" dirty="0" err="1"/>
+              <a:t>Root,OU</a:t>
+            </a:r>
+            <a:r>
+              <a:rPr lang="en-US" dirty="0"/>
+              <a:t>=</a:t>
+            </a:r>
+            <a:r>
+              <a:rPr lang="en-US" dirty="0" err="1"/>
+              <a:t>AddTrust</a:t>
+            </a:r>
+            <a:r>
+              <a:rPr lang="en-US" dirty="0"/>
+              <a:t> External TTP </a:t>
+            </a:r>
+            <a:r>
+              <a:rPr lang="en-US" dirty="0" err="1"/>
+              <a:t>Network,O</a:t>
+            </a:r>
+            <a:r>
+              <a:rPr lang="en-US" dirty="0"/>
+              <a:t>=</a:t>
+            </a:r>
+            <a:r>
+              <a:rPr lang="en-US" dirty="0" err="1"/>
+              <a:t>AddTrust</a:t>
+            </a:r>
+            <a:r>
+              <a:rPr lang="en-US" dirty="0"/>
+              <a:t> AB,C=SE signed </a:t>
+            </a:r>
+            <a:r>
+              <a:rPr lang="en-US" dirty="0" smtClean="0"/>
+              <a:t>CN=</a:t>
+            </a:r>
+            <a:r>
+              <a:rPr lang="en-US" dirty="0" smtClean="0">
+                <a:solidFill>
+                  <a:srgbClr val="FF0000"/>
+                </a:solidFill>
+              </a:rPr>
+              <a:t>sac-</a:t>
+            </a:r>
+            <a:r>
+              <a:rPr lang="en-US" dirty="0" err="1" smtClean="0">
+                <a:solidFill>
+                  <a:srgbClr val="FF0000"/>
+                </a:solidFill>
+              </a:rPr>
+              <a:t>aruba</a:t>
+            </a:r>
+            <a:r>
+              <a:rPr lang="en-US" dirty="0" smtClean="0">
+                <a:solidFill>
+                  <a:srgbClr val="FF0000"/>
+                </a:solidFill>
+              </a:rPr>
+              <a:t>-</a:t>
+            </a:r>
+            <a:r>
+              <a:rPr lang="en-US" dirty="0" err="1" smtClean="0">
+                <a:solidFill>
+                  <a:srgbClr val="FF0000"/>
+                </a:solidFill>
+              </a:rPr>
+              <a:t>cp.csus.edu</a:t>
+            </a:r>
+            <a:r>
+              <a:rPr lang="en-US" dirty="0" err="1" smtClean="0"/>
+              <a:t>,OU</a:t>
+            </a:r>
+            <a:r>
+              <a:rPr lang="en-US" dirty="0" smtClean="0"/>
+              <a:t>=</a:t>
+            </a:r>
+            <a:r>
+              <a:rPr lang="en-US" dirty="0" err="1" smtClean="0"/>
+              <a:t>PlatinumSSL,OU</a:t>
+            </a:r>
+            <a:r>
+              <a:rPr lang="en-US" dirty="0" smtClean="0"/>
+              <a:t>=</a:t>
+            </a:r>
+            <a:r>
+              <a:rPr lang="en-US" dirty="0" smtClean="0">
+                <a:solidFill>
+                  <a:srgbClr val="FF0000"/>
+                </a:solidFill>
+              </a:rPr>
+              <a:t>California </a:t>
+            </a:r>
+            <a:r>
+              <a:rPr lang="en-US" dirty="0">
+                <a:solidFill>
+                  <a:srgbClr val="FF0000"/>
+                </a:solidFill>
+              </a:rPr>
+              <a:t>State University </a:t>
+            </a:r>
+            <a:r>
+              <a:rPr lang="en-US" dirty="0" err="1" smtClean="0">
+                <a:solidFill>
+                  <a:srgbClr val="FF0000"/>
+                </a:solidFill>
+              </a:rPr>
+              <a:t>Sacramento</a:t>
+            </a:r>
+            <a:r>
+              <a:rPr lang="en-US" dirty="0" err="1" smtClean="0"/>
+              <a:t>,O</a:t>
+            </a:r>
+            <a:r>
+              <a:rPr lang="en-US" dirty="0" smtClean="0"/>
+              <a:t>=</a:t>
+            </a:r>
+            <a:r>
+              <a:rPr lang="en-US" dirty="0" smtClean="0">
+                <a:solidFill>
+                  <a:srgbClr val="FF0000"/>
+                </a:solidFill>
+              </a:rPr>
+              <a:t>California </a:t>
+            </a:r>
+            <a:r>
+              <a:rPr lang="en-US" dirty="0">
+                <a:solidFill>
+                  <a:srgbClr val="FF0000"/>
+                </a:solidFill>
+              </a:rPr>
+              <a:t>State University</a:t>
+            </a:r>
+            <a:r>
+              <a:rPr lang="en-US" dirty="0"/>
+              <a:t>\, </a:t>
+            </a:r>
+            <a:r>
+              <a:rPr lang="en-US" dirty="0" err="1"/>
+              <a:t>Sacramento,STREET</a:t>
+            </a:r>
+            <a:r>
+              <a:rPr lang="en-US" dirty="0"/>
+              <a:t>=6000 J </a:t>
+            </a:r>
+            <a:r>
+              <a:rPr lang="en-US" dirty="0" err="1"/>
+              <a:t>Street,STREET</a:t>
+            </a:r>
+            <a:r>
+              <a:rPr lang="en-US" dirty="0"/>
+              <a:t>=ARC-3010,L=</a:t>
+            </a:r>
+            <a:r>
+              <a:rPr lang="en-US" dirty="0" err="1"/>
+              <a:t>Sacramento,ST</a:t>
+            </a:r>
+            <a:r>
+              <a:rPr lang="en-US" dirty="0"/>
+              <a:t>=CA,2.5.4.17=#13053935383139,C=US: </a:t>
+            </a:r>
+            <a:r>
+              <a:rPr lang="en-US" dirty="0" err="1"/>
+              <a:t>java.security.SignatureException</a:t>
+            </a:r>
+            <a:r>
+              <a:rPr lang="en-US" dirty="0"/>
+              <a:t>: </a:t>
+            </a:r>
+            <a:r>
+              <a:rPr lang="en-US" dirty="0" smtClean="0">
+                <a:solidFill>
+                  <a:srgbClr val="FF0000"/>
+                </a:solidFill>
+              </a:rPr>
+              <a:t>Signature </a:t>
+            </a:r>
+            <a:r>
+              <a:rPr lang="en-US" dirty="0">
+                <a:solidFill>
+                  <a:srgbClr val="FF0000"/>
+                </a:solidFill>
+              </a:rPr>
+              <a:t>does not match</a:t>
+            </a:r>
+            <a:r>
+              <a:rPr lang="en-US" dirty="0"/>
+              <a:t>.</a:t>
+            </a:r>
+          </a:p>
+        </p:txBody>
+      </p:sp>
+      <p:sp>
+        <p:nvSpPr>
+          <p:cNvPr id="4" name="TextBox 3"/>
+          <p:cNvSpPr txBox="1"/>
+          <p:nvPr/>
+        </p:nvSpPr>
+        <p:spPr>
+          <a:xfrm>
+            <a:off x="3276600" y="5955268"/>
+            <a:ext cx="5428089" cy="369332"/>
+          </a:xfrm>
+          <a:prstGeom prst="rect">
+            <a:avLst/>
+          </a:prstGeom>
+          <a:noFill/>
+          <a:ln>
+            <a:solidFill>
+              <a:schemeClr val="accent2"/>
+            </a:solidFill>
+          </a:ln>
+        </p:spPr>
+        <p:txBody>
+          <a:bodyPr wrap="none" rtlCol="0">
+            <a:spAutoFit/>
+          </a:bodyPr>
+          <a:lstStyle/>
+          <a:p>
+            <a:r>
+              <a:rPr lang="en-US" dirty="0" err="1">
+                <a:solidFill>
+                  <a:srgbClr val="FF0000"/>
+                </a:solidFill>
+              </a:rPr>
+              <a:t>TlsPolicy</a:t>
+            </a:r>
+            <a:r>
+              <a:rPr lang="en-US" dirty="0">
+                <a:solidFill>
+                  <a:srgbClr val="FF0000"/>
+                </a:solidFill>
+              </a:rPr>
+              <a:t> </a:t>
+            </a:r>
+            <a:r>
+              <a:rPr lang="en-US" dirty="0" err="1">
+                <a:solidFill>
+                  <a:srgbClr val="FF0000"/>
+                </a:solidFill>
+              </a:rPr>
+              <a:t>tlsPolicy</a:t>
+            </a:r>
+            <a:r>
+              <a:rPr lang="en-US" dirty="0">
+                <a:solidFill>
+                  <a:srgbClr val="FF0000"/>
+                </a:solidFill>
+              </a:rPr>
+              <a:t> = </a:t>
+            </a:r>
+            <a:r>
+              <a:rPr lang="en-US" dirty="0" err="1">
+                <a:solidFill>
+                  <a:srgbClr val="FF0000"/>
+                </a:solidFill>
+              </a:rPr>
+              <a:t>TlsPolicyCommon.consoleBrowser</a:t>
+            </a:r>
+            <a:r>
+              <a:rPr lang="en-US" dirty="0" smtClean="0">
+                <a:solidFill>
+                  <a:srgbClr val="FF0000"/>
+                </a:solidFill>
+              </a:rPr>
+              <a:t>();</a:t>
+            </a:r>
+            <a:endParaRPr lang="en-US" dirty="0">
+              <a:solidFill>
+                <a:srgbClr val="FF0000"/>
+              </a:solidFill>
+            </a:endParaRPr>
+          </a:p>
+        </p:txBody>
+      </p:sp>
+      <p:sp>
+        <p:nvSpPr>
+          <p:cNvPr id="5" name="TextBox 4"/>
+          <p:cNvSpPr txBox="1"/>
+          <p:nvPr/>
+        </p:nvSpPr>
+        <p:spPr>
+          <a:xfrm>
+            <a:off x="533400" y="1127746"/>
+            <a:ext cx="4678781" cy="369332"/>
+          </a:xfrm>
+          <a:prstGeom prst="rect">
+            <a:avLst/>
+          </a:prstGeom>
+          <a:noFill/>
+          <a:ln>
+            <a:noFill/>
+          </a:ln>
+        </p:spPr>
+        <p:txBody>
+          <a:bodyPr wrap="none" rtlCol="0">
+            <a:spAutoFit/>
+          </a:bodyPr>
+          <a:lstStyle/>
+          <a:p>
+            <a:r>
+              <a:rPr lang="en-US" dirty="0" smtClean="0">
+                <a:solidFill>
+                  <a:srgbClr val="FF0000"/>
+                </a:solidFill>
+              </a:rPr>
+              <a:t>But from CSUS…  WIFI login intercepts requests!</a:t>
+            </a:r>
+            <a:endParaRPr lang="en-US" dirty="0">
+              <a:solidFill>
+                <a:srgbClr val="FF0000"/>
+              </a:solidFill>
+            </a:endParaRPr>
+          </a:p>
+        </p:txBody>
+      </p:sp>
+    </p:spTree>
+    <p:extLst>
+      <p:ext uri="{BB962C8B-B14F-4D97-AF65-F5344CB8AC3E}">
+        <p14:creationId xmlns:p14="http://schemas.microsoft.com/office/powerpoint/2010/main" val="3481157599"/>
+      </p:ext>
+    </p:extLst>
+  </p:cSld>
+  <p:clrMapOvr>
+    <a:masterClrMapping/>
+  </p:clrMapOvr>
+</p:sld>
+</file>
+
+<file path=ppt/slides/slide21.xml><?xml version="1.0" encoding="utf-8"?>
+<p:sld xmlns:a="http://schemas.openxmlformats.org/drawingml/2006/main" xmlns:r="http://schemas.openxmlformats.org/officeDocument/2006/relationships" xmlns:p="http://schemas.openxmlformats.org/presentationml/2006/main">
+  <p:cSld>
+    <p:spTree>
+      <p:nvGrpSpPr>
+        <p:cNvPr id="1" name=""/>
+        <p:cNvGrpSpPr/>
+        <p:nvPr/>
+      </p:nvGrpSpPr>
+      <p:grpSpPr>
+        <a:xfrm>
+          <a:off x="0" y="0"/>
+          <a:ext cx="0" cy="0"/>
+          <a:chOff x="0" y="0"/>
+          <a:chExt cx="0" cy="0"/>
+        </a:xfrm>
+      </p:grpSpPr>
+      <p:sp>
+        <p:nvSpPr>
+          <p:cNvPr id="2" name="Title 1"/>
+          <p:cNvSpPr>
+            <a:spLocks noGrp="1"/>
+          </p:cNvSpPr>
+          <p:nvPr>
+            <p:ph type="title"/>
+          </p:nvPr>
+        </p:nvSpPr>
+        <p:spPr/>
+        <p:txBody>
+          <a:bodyPr/>
+          <a:lstStyle/>
+          <a:p>
+            <a:r>
+              <a:rPr lang="en-US" dirty="0" smtClean="0"/>
+              <a:t>Demonstration</a:t>
+            </a:r>
+            <a:endParaRPr lang="en-US" dirty="0"/>
+          </a:p>
+        </p:txBody>
+      </p:sp>
+      <p:sp>
+        <p:nvSpPr>
+          <p:cNvPr id="3" name="Content Placeholder 2"/>
+          <p:cNvSpPr>
+            <a:spLocks noGrp="1"/>
+          </p:cNvSpPr>
+          <p:nvPr>
+            <p:ph idx="1"/>
+          </p:nvPr>
+        </p:nvSpPr>
+        <p:spPr/>
+        <p:txBody>
+          <a:bodyPr>
+            <a:normAutofit/>
+          </a:bodyPr>
+          <a:lstStyle/>
+          <a:p>
+            <a:pPr marL="0" indent="0">
+              <a:buNone/>
+            </a:pPr>
+            <a:r>
+              <a:rPr lang="en-US" dirty="0"/>
+              <a:t>C:\&gt; </a:t>
+            </a:r>
+            <a:r>
+              <a:rPr lang="en-US" b="1" dirty="0"/>
+              <a:t>java -</a:t>
+            </a:r>
+            <a:r>
+              <a:rPr lang="en-US" b="1" dirty="0" err="1"/>
+              <a:t>cp</a:t>
+            </a:r>
+            <a:r>
+              <a:rPr lang="en-US" b="1" dirty="0"/>
+              <a:t> tls-policy-example.jar </a:t>
+            </a:r>
+            <a:r>
+              <a:rPr lang="en-US" b="1" dirty="0" err="1" smtClean="0"/>
+              <a:t>example.MainWithUnsupportedTlsPolicy</a:t>
+            </a:r>
+            <a:r>
+              <a:rPr lang="en-US" b="1" dirty="0" smtClean="0"/>
+              <a:t> </a:t>
+            </a:r>
+            <a:r>
+              <a:rPr lang="en-US" b="1" dirty="0"/>
+              <a:t>https://www.google.com</a:t>
+            </a:r>
+            <a:endParaRPr lang="en-US" dirty="0"/>
+          </a:p>
+          <a:p>
+            <a:pPr marL="0" indent="0">
+              <a:buNone/>
+            </a:pPr>
+            <a:r>
+              <a:rPr lang="en-US" dirty="0"/>
+              <a:t>ERROR: </a:t>
+            </a:r>
+            <a:r>
+              <a:rPr lang="en-US" dirty="0" err="1"/>
+              <a:t>java.lang.IllegalArgumentException</a:t>
+            </a:r>
+            <a:r>
+              <a:rPr lang="en-US" dirty="0"/>
+              <a:t>: Authenticated non-encrypted HTTP tunnel not yet supported</a:t>
+            </a:r>
+          </a:p>
+        </p:txBody>
+      </p:sp>
+      <p:sp>
+        <p:nvSpPr>
+          <p:cNvPr id="6" name="TextBox 5"/>
+          <p:cNvSpPr txBox="1"/>
+          <p:nvPr/>
+        </p:nvSpPr>
+        <p:spPr>
+          <a:xfrm>
+            <a:off x="4495800" y="5257800"/>
+            <a:ext cx="4464748" cy="1477328"/>
+          </a:xfrm>
+          <a:prstGeom prst="rect">
+            <a:avLst/>
+          </a:prstGeom>
+          <a:noFill/>
+          <a:ln>
+            <a:solidFill>
+              <a:schemeClr val="accent2"/>
+            </a:solidFill>
+          </a:ln>
+        </p:spPr>
+        <p:txBody>
+          <a:bodyPr wrap="square" rtlCol="0">
+            <a:spAutoFit/>
+          </a:bodyPr>
+          <a:lstStyle/>
+          <a:p>
+            <a:r>
+              <a:rPr lang="en-US" dirty="0" err="1">
+                <a:solidFill>
+                  <a:srgbClr val="FF0000"/>
+                </a:solidFill>
+              </a:rPr>
+              <a:t>TlsPolicy</a:t>
+            </a:r>
+            <a:r>
+              <a:rPr lang="en-US" dirty="0">
+                <a:solidFill>
+                  <a:srgbClr val="FF0000"/>
+                </a:solidFill>
+              </a:rPr>
+              <a:t> </a:t>
+            </a:r>
+            <a:r>
+              <a:rPr lang="en-US" dirty="0" err="1">
+                <a:solidFill>
+                  <a:srgbClr val="FF0000"/>
+                </a:solidFill>
+              </a:rPr>
+              <a:t>tlsPolicy</a:t>
+            </a:r>
+            <a:r>
+              <a:rPr lang="en-US" dirty="0">
+                <a:solidFill>
+                  <a:srgbClr val="FF0000"/>
+                </a:solidFill>
+              </a:rPr>
+              <a:t> = </a:t>
+            </a:r>
+            <a:r>
+              <a:rPr lang="en-US" dirty="0" err="1">
+                <a:solidFill>
+                  <a:srgbClr val="FF0000"/>
+                </a:solidFill>
+              </a:rPr>
+              <a:t>TlsPolicyBuilder.factory</a:t>
+            </a:r>
+            <a:r>
+              <a:rPr lang="en-US" dirty="0" smtClean="0">
+                <a:solidFill>
+                  <a:srgbClr val="FF0000"/>
+                </a:solidFill>
+              </a:rPr>
+              <a:t>()</a:t>
+            </a:r>
+          </a:p>
+          <a:p>
+            <a:r>
+              <a:rPr lang="en-US" dirty="0" smtClean="0">
+                <a:solidFill>
+                  <a:srgbClr val="FF0000"/>
+                </a:solidFill>
+              </a:rPr>
+              <a:t>.</a:t>
+            </a:r>
+            <a:r>
+              <a:rPr lang="en-US" dirty="0" err="1">
+                <a:solidFill>
+                  <a:srgbClr val="FF0000"/>
+                </a:solidFill>
+              </a:rPr>
+              <a:t>providesAuthentication</a:t>
+            </a:r>
+            <a:r>
+              <a:rPr lang="en-US" dirty="0" smtClean="0">
+                <a:solidFill>
+                  <a:srgbClr val="FF0000"/>
+                </a:solidFill>
+              </a:rPr>
+              <a:t>()</a:t>
+            </a:r>
+          </a:p>
+          <a:p>
+            <a:r>
+              <a:rPr lang="en-US" b="1" dirty="0" smtClean="0">
+                <a:solidFill>
+                  <a:srgbClr val="FF0000"/>
+                </a:solidFill>
+              </a:rPr>
+              <a:t>.</a:t>
+            </a:r>
+            <a:r>
+              <a:rPr lang="en-US" b="1" dirty="0" err="1" smtClean="0">
+                <a:solidFill>
+                  <a:srgbClr val="FF0000"/>
+                </a:solidFill>
+              </a:rPr>
+              <a:t>noConfidentiality</a:t>
+            </a:r>
+            <a:r>
+              <a:rPr lang="en-US" b="1" dirty="0" smtClean="0">
+                <a:solidFill>
+                  <a:srgbClr val="FF0000"/>
+                </a:solidFill>
+              </a:rPr>
+              <a:t>()</a:t>
+            </a:r>
+          </a:p>
+          <a:p>
+            <a:r>
+              <a:rPr lang="en-US" dirty="0" smtClean="0">
+                <a:solidFill>
+                  <a:srgbClr val="FF0000"/>
+                </a:solidFill>
+              </a:rPr>
+              <a:t>.</a:t>
+            </a:r>
+            <a:r>
+              <a:rPr lang="en-US" dirty="0" err="1">
+                <a:solidFill>
+                  <a:srgbClr val="FF0000"/>
+                </a:solidFill>
+              </a:rPr>
+              <a:t>providesIntegrity</a:t>
+            </a:r>
+            <a:r>
+              <a:rPr lang="en-US" dirty="0" smtClean="0">
+                <a:solidFill>
+                  <a:srgbClr val="FF0000"/>
+                </a:solidFill>
+              </a:rPr>
+              <a:t>()</a:t>
+            </a:r>
+          </a:p>
+          <a:p>
+            <a:r>
+              <a:rPr lang="en-US" dirty="0" smtClean="0">
+                <a:solidFill>
+                  <a:srgbClr val="FF0000"/>
+                </a:solidFill>
+              </a:rPr>
+              <a:t>.</a:t>
+            </a:r>
+            <a:r>
+              <a:rPr lang="en-US" dirty="0" err="1">
+                <a:solidFill>
+                  <a:srgbClr val="FF0000"/>
+                </a:solidFill>
+              </a:rPr>
+              <a:t>certificateRepository</a:t>
+            </a:r>
+            <a:r>
+              <a:rPr lang="en-US" dirty="0">
+                <a:solidFill>
+                  <a:srgbClr val="FF0000"/>
+                </a:solidFill>
+              </a:rPr>
+              <a:t>(repository).build();</a:t>
+            </a:r>
+          </a:p>
+        </p:txBody>
+      </p:sp>
+    </p:spTree>
+    <p:extLst>
+      <p:ext uri="{BB962C8B-B14F-4D97-AF65-F5344CB8AC3E}">
+        <p14:creationId xmlns:p14="http://schemas.microsoft.com/office/powerpoint/2010/main" val="1551362208"/>
+      </p:ext>
+    </p:extLst>
+  </p:cSld>
+  <p:clrMapOvr>
+    <a:masterClrMapping/>
+  </p:clrMapOvr>
+</p:sld>
+</file>
+
+<file path=ppt/slides/slide22.xml><?xml version="1.0" encoding="utf-8"?>
+<p:sld xmlns:a="http://schemas.openxmlformats.org/drawingml/2006/main" xmlns:r="http://schemas.openxmlformats.org/officeDocument/2006/relationships" xmlns:p="http://schemas.openxmlformats.org/presentationml/2006/main">
+  <p:cSld>
+    <p:spTree>
+      <p:nvGrpSpPr>
+        <p:cNvPr id="1" name=""/>
+        <p:cNvGrpSpPr/>
+        <p:nvPr/>
+      </p:nvGrpSpPr>
+      <p:grpSpPr>
+        <a:xfrm>
+          <a:off x="0" y="0"/>
+          <a:ext cx="0" cy="0"/>
+          <a:chOff x="0" y="0"/>
+          <a:chExt cx="0" cy="0"/>
+        </a:xfrm>
+      </p:grpSpPr>
+      <p:sp>
+        <p:nvSpPr>
+          <p:cNvPr id="2" name="Title 1"/>
+          <p:cNvSpPr>
+            <a:spLocks noGrp="1"/>
+          </p:cNvSpPr>
+          <p:nvPr>
+            <p:ph type="title"/>
+          </p:nvPr>
+        </p:nvSpPr>
+        <p:spPr/>
+        <p:txBody>
+          <a:bodyPr/>
+          <a:lstStyle/>
+          <a:p>
+            <a:r>
+              <a:rPr lang="en-US" dirty="0" smtClean="0"/>
+              <a:t>Conclusion</a:t>
+            </a:r>
+            <a:endParaRPr lang="en-US" dirty="0"/>
+          </a:p>
+        </p:txBody>
+      </p:sp>
+      <p:sp>
+        <p:nvSpPr>
+          <p:cNvPr id="3" name="Content Placeholder 2"/>
+          <p:cNvSpPr>
+            <a:spLocks noGrp="1"/>
+          </p:cNvSpPr>
+          <p:nvPr>
+            <p:ph idx="1"/>
+          </p:nvPr>
+        </p:nvSpPr>
+        <p:spPr/>
+        <p:txBody>
+          <a:bodyPr>
+            <a:normAutofit/>
+          </a:bodyPr>
+          <a:lstStyle/>
+          <a:p>
+            <a:r>
+              <a:rPr lang="en-US" dirty="0" smtClean="0"/>
+              <a:t>Easy to use</a:t>
+            </a:r>
+          </a:p>
+          <a:p>
+            <a:pPr lvl="1"/>
+            <a:r>
+              <a:rPr lang="en-US" dirty="0" smtClean="0"/>
+              <a:t>Typical secure or insecure client in 1 line of code</a:t>
+            </a:r>
+          </a:p>
+          <a:p>
+            <a:pPr lvl="1"/>
+            <a:r>
+              <a:rPr lang="en-US" dirty="0" smtClean="0"/>
+              <a:t>Custom secure client with 2-3 lines of code</a:t>
+            </a:r>
+          </a:p>
+          <a:p>
+            <a:r>
+              <a:rPr lang="en-US" dirty="0" smtClean="0"/>
+              <a:t>Design objectives were met</a:t>
+            </a:r>
+          </a:p>
+          <a:p>
+            <a:pPr lvl="1"/>
+            <a:r>
+              <a:rPr lang="en-US" dirty="0" smtClean="0"/>
+              <a:t>Method to create policy spells out its behavior</a:t>
+            </a:r>
+          </a:p>
+          <a:p>
+            <a:pPr lvl="1"/>
+            <a:r>
+              <a:rPr lang="en-US" dirty="0" smtClean="0"/>
+              <a:t>Type-safe options, clearly named</a:t>
+            </a:r>
+            <a:endParaRPr lang="en-US" dirty="0"/>
+          </a:p>
+        </p:txBody>
+      </p:sp>
+    </p:spTree>
+    <p:extLst>
+      <p:ext uri="{BB962C8B-B14F-4D97-AF65-F5344CB8AC3E}">
+        <p14:creationId xmlns:p14="http://schemas.microsoft.com/office/powerpoint/2010/main" val="1957700650"/>
+      </p:ext>
+    </p:extLst>
+  </p:cSld>
+  <p:clrMapOvr>
+    <a:masterClrMapping/>
+  </p:clrMapOvr>
+</p:sld>
+</file>
+
+<file path=ppt/slides/slide23.xml><?xml version="1.0" encoding="utf-8"?>
+<p:sld xmlns:a="http://schemas.openxmlformats.org/drawingml/2006/main" xmlns:r="http://schemas.openxmlformats.org/officeDocument/2006/relationships" xmlns:p="http://schemas.openxmlformats.org/presentationml/2006/main">
+  <p:cSld>
+    <p:spTree>
+      <p:nvGrpSpPr>
+        <p:cNvPr id="1" name=""/>
+        <p:cNvGrpSpPr/>
+        <p:nvPr/>
+      </p:nvGrpSpPr>
+      <p:grpSpPr>
+        <a:xfrm>
+          <a:off x="0" y="0"/>
+          <a:ext cx="0" cy="0"/>
+          <a:chOff x="0" y="0"/>
+          <a:chExt cx="0" cy="0"/>
+        </a:xfrm>
+      </p:grpSpPr>
+      <p:sp>
+        <p:nvSpPr>
+          <p:cNvPr id="2" name="Title 1"/>
+          <p:cNvSpPr>
+            <a:spLocks noGrp="1"/>
+          </p:cNvSpPr>
+          <p:nvPr>
+            <p:ph type="title"/>
+          </p:nvPr>
+        </p:nvSpPr>
+        <p:spPr/>
+        <p:txBody>
+          <a:bodyPr/>
+          <a:lstStyle/>
+          <a:p>
+            <a:r>
+              <a:rPr lang="en-US" dirty="0" smtClean="0"/>
               <a:t>References</a:t>
             </a:r>
             <a:endParaRPr lang="en-US" dirty="0"/>
@@ -8233,7 +9314,7 @@
     </p:spTree>
     <p:extLst>
       <p:ext uri="{BB962C8B-B14F-4D97-AF65-F5344CB8AC3E}">
-        <p14:creationId xmlns:p14="http://schemas.microsoft.com/office/powerpoint/2010/main" val="871462257"/>
+        <p14:creationId xmlns:p14="http://schemas.microsoft.com/office/powerpoint/2010/main" val="4219983140"/>
       </p:ext>
     </p:extLst>
   </p:cSld>
@@ -8474,7 +9555,7 @@
     </p:spTree>
     <p:extLst>
       <p:ext uri="{BB962C8B-B14F-4D97-AF65-F5344CB8AC3E}">
-        <p14:creationId xmlns:p14="http://schemas.microsoft.com/office/powerpoint/2010/main" val="816064306"/>
+        <p14:creationId xmlns:p14="http://schemas.microsoft.com/office/powerpoint/2010/main" val="1981453793"/>
       </p:ext>
     </p:extLst>
   </p:cSld>
@@ -8636,7 +9717,7 @@
     </p:spTree>
     <p:extLst>
       <p:ext uri="{BB962C8B-B14F-4D97-AF65-F5344CB8AC3E}">
-        <p14:creationId xmlns:p14="http://schemas.microsoft.com/office/powerpoint/2010/main" val="3553540487"/>
+        <p14:creationId xmlns:p14="http://schemas.microsoft.com/office/powerpoint/2010/main" val="2411893770"/>
       </p:ext>
     </p:extLst>
   </p:cSld>
@@ -8740,7 +9821,7 @@
     </p:spTree>
     <p:extLst>
       <p:ext uri="{BB962C8B-B14F-4D97-AF65-F5344CB8AC3E}">
-        <p14:creationId xmlns:p14="http://schemas.microsoft.com/office/powerpoint/2010/main" val="1327136957"/>
+        <p14:creationId xmlns:p14="http://schemas.microsoft.com/office/powerpoint/2010/main" val="412168508"/>
       </p:ext>
     </p:extLst>
   </p:cSld>
@@ -8977,7 +10058,7 @@
     </p:spTree>
     <p:extLst>
       <p:ext uri="{BB962C8B-B14F-4D97-AF65-F5344CB8AC3E}">
-        <p14:creationId xmlns:p14="http://schemas.microsoft.com/office/powerpoint/2010/main" val="3887492874"/>
+        <p14:creationId xmlns:p14="http://schemas.microsoft.com/office/powerpoint/2010/main" val="1121252317"/>
       </p:ext>
     </p:extLst>
   </p:cSld>
@@ -9185,7 +10266,7 @@
     </p:spTree>
     <p:extLst>
       <p:ext uri="{BB962C8B-B14F-4D97-AF65-F5344CB8AC3E}">
-        <p14:creationId xmlns:p14="http://schemas.microsoft.com/office/powerpoint/2010/main" val="1029365517"/>
+        <p14:creationId xmlns:p14="http://schemas.microsoft.com/office/powerpoint/2010/main" val="2277589983"/>
       </p:ext>
     </p:extLst>
   </p:cSld>
@@ -9401,7 +10482,7 @@
     </p:spTree>
     <p:extLst>
       <p:ext uri="{BB962C8B-B14F-4D97-AF65-F5344CB8AC3E}">
-        <p14:creationId xmlns:p14="http://schemas.microsoft.com/office/powerpoint/2010/main" val="2644676054"/>
+        <p14:creationId xmlns:p14="http://schemas.microsoft.com/office/powerpoint/2010/main" val="2565544000"/>
       </p:ext>
     </p:extLst>
   </p:cSld>
@@ -9595,7 +10676,7 @@
     </p:spTree>
     <p:extLst>
       <p:ext uri="{BB962C8B-B14F-4D97-AF65-F5344CB8AC3E}">
-        <p14:creationId xmlns:p14="http://schemas.microsoft.com/office/powerpoint/2010/main" val="1438833402"/>
+        <p14:creationId xmlns:p14="http://schemas.microsoft.com/office/powerpoint/2010/main" val="2432367377"/>
       </p:ext>
     </p:extLst>
   </p:cSld>

</xml_diff>